<commit_message>
Added voxel grid and A* slides
</commit_message>
<xml_diff>
--- a/Autonomous Wheelchair using Structured Light.pptx
+++ b/Autonomous Wheelchair using Structured Light.pptx
@@ -15,13 +15,13 @@
     <p:sldId id="261" r:id="rId6"/>
     <p:sldId id="262" r:id="rId7"/>
     <p:sldId id="263" r:id="rId8"/>
-    <p:sldId id="264" r:id="rId9"/>
-    <p:sldId id="265" r:id="rId10"/>
+    <p:sldId id="265" r:id="rId9"/>
+    <p:sldId id="275" r:id="rId10"/>
     <p:sldId id="269" r:id="rId11"/>
     <p:sldId id="266" r:id="rId12"/>
     <p:sldId id="271" r:id="rId13"/>
     <p:sldId id="267" r:id="rId14"/>
-    <p:sldId id="270" r:id="rId15"/>
+    <p:sldId id="274" r:id="rId15"/>
     <p:sldId id="268" r:id="rId16"/>
     <p:sldId id="272" r:id="rId17"/>
     <p:sldId id="273" r:id="rId18"/>
@@ -545,7 +545,7 @@
           <a:p>
             <a:fld id="{9E6D6E69-4347-40FE-8043-2CC6727466E7}" type="slidenum">
               <a:rPr lang="en-GB" smtClean="0"/>
-              <a:t>9</a:t>
+              <a:t>8</a:t>
             </a:fld>
             <a:endParaRPr lang="en-GB"/>
           </a:p>
@@ -4181,7 +4181,7 @@
       </p:grpSpPr>
       <p:sp>
         <p:nvSpPr>
-          <p:cNvPr id="2" name="Title 1"/>
+          <p:cNvPr id="4" name="Title 3"/>
           <p:cNvSpPr>
             <a:spLocks noGrp="1"/>
           </p:cNvSpPr>
@@ -4198,49 +4198,172 @@
           <a:p>
             <a:r>
               <a:rPr lang="en-GB" dirty="0" smtClean="0"/>
-              <a:t>For Your Information – A* (A Star) </a:t>
+              <a:t>For Your Information – A* (A Star) Search Algorithm</a:t>
+            </a:r>
+            <a:endParaRPr lang="en-GB" dirty="0"/>
+          </a:p>
+        </p:txBody>
+      </p:sp>
+      <p:pic>
+        <p:nvPicPr>
+          <p:cNvPr id="6" name="Content Placeholder 5"/>
+          <p:cNvPicPr>
+            <a:picLocks noGrp="1" noChangeAspect="1"/>
+          </p:cNvPicPr>
+          <p:nvPr>
+            <p:ph sz="half" idx="1"/>
+          </p:nvPr>
+        </p:nvPicPr>
+        <p:blipFill>
+          <a:blip r:embed="rId2">
+            <a:extLst>
+              <a:ext uri="{28A0092B-C50C-407E-A947-70E740481C1C}">
+                <a14:useLocalDpi xmlns:a14="http://schemas.microsoft.com/office/drawing/2010/main" val="0"/>
+              </a:ext>
+            </a:extLst>
+          </a:blip>
+          <a:stretch>
+            <a:fillRect/>
+          </a:stretch>
+        </p:blipFill>
+        <p:spPr>
+          <a:xfrm>
+            <a:off x="5652120" y="2204864"/>
+            <a:ext cx="2736304" cy="2736304"/>
+          </a:xfrm>
+        </p:spPr>
+      </p:pic>
+      <p:sp>
+        <p:nvSpPr>
+          <p:cNvPr id="8" name="Content Placeholder 7"/>
+          <p:cNvSpPr>
+            <a:spLocks noGrp="1"/>
+          </p:cNvSpPr>
+          <p:nvPr>
+            <p:ph sz="half" idx="2"/>
+          </p:nvPr>
+        </p:nvSpPr>
+        <p:spPr>
+          <a:xfrm>
+            <a:off x="539552" y="1556792"/>
+            <a:ext cx="4968552" cy="4536504"/>
+          </a:xfrm>
+        </p:spPr>
+        <p:txBody>
+          <a:bodyPr>
+            <a:normAutofit fontScale="92500" lnSpcReduction="10000"/>
+          </a:bodyPr>
+          <a:lstStyle/>
+          <a:p>
+            <a:r>
+              <a:rPr lang="en-GB" dirty="0" smtClean="0"/>
+              <a:t>Faster extension of </a:t>
             </a:r>
             <a:r>
               <a:rPr lang="en-GB" dirty="0" err="1" smtClean="0"/>
-              <a:t>Pathfinding</a:t>
-            </a:r>
-            <a:r>
-              <a:rPr lang="en-GB" dirty="0" smtClean="0"/>
-              <a:t> Algorithm</a:t>
+              <a:t>Dijkstra's</a:t>
+            </a:r>
+            <a:r>
+              <a:rPr lang="en-GB" dirty="0" smtClean="0"/>
+              <a:t> algorithm</a:t>
+            </a:r>
+          </a:p>
+          <a:p>
+            <a:r>
+              <a:rPr lang="en-GB" dirty="0" smtClean="0"/>
+              <a:t>Space represented as 2D array with each cell either passable or impassable</a:t>
+            </a:r>
+          </a:p>
+          <a:p>
+            <a:r>
+              <a:rPr lang="en-GB" dirty="0" smtClean="0"/>
+              <a:t>Uses a distance-plus-cost function to determine which nodes to search next:</a:t>
+            </a:r>
+          </a:p>
+          <a:p>
+            <a:pPr lvl="1"/>
+            <a:r>
+              <a:rPr lang="en-GB" dirty="0" smtClean="0"/>
+              <a:t>Function of cost  from start cell to current cell</a:t>
+            </a:r>
+          </a:p>
+          <a:p>
+            <a:pPr lvl="1"/>
+            <a:r>
+              <a:rPr lang="en-GB" dirty="0" smtClean="0"/>
+              <a:t>Plus estimated distance from current cell to finish</a:t>
             </a:r>
             <a:endParaRPr lang="en-GB" dirty="0"/>
           </a:p>
-        </p:txBody>
-      </p:sp>
-      <p:sp>
-        <p:nvSpPr>
-          <p:cNvPr id="3" name="Content Placeholder 2"/>
-          <p:cNvSpPr>
-            <a:spLocks noGrp="1"/>
-          </p:cNvSpPr>
-          <p:nvPr>
-            <p:ph idx="1"/>
-          </p:nvPr>
-        </p:nvSpPr>
-        <p:spPr/>
-        <p:txBody>
-          <a:bodyPr/>
-          <a:lstStyle/>
+          <a:p>
+            <a:endParaRPr lang="en-GB" dirty="0" smtClean="0"/>
+          </a:p>
           <a:p>
             <a:endParaRPr lang="en-GB" dirty="0"/>
+          </a:p>
+        </p:txBody>
+      </p:sp>
+      <p:sp>
+        <p:nvSpPr>
+          <p:cNvPr id="7" name="TextBox 6"/>
+          <p:cNvSpPr txBox="1"/>
+          <p:nvPr/>
+        </p:nvSpPr>
+        <p:spPr>
+          <a:xfrm>
+            <a:off x="5035118" y="6529911"/>
+            <a:ext cx="4108882" cy="276999"/>
+          </a:xfrm>
+          <a:prstGeom prst="rect">
+            <a:avLst/>
+          </a:prstGeom>
+          <a:noFill/>
+        </p:spPr>
+        <p:txBody>
+          <a:bodyPr wrap="none" rtlCol="0">
+            <a:spAutoFit/>
+          </a:bodyPr>
+          <a:lstStyle/>
+          <a:p>
+            <a:r>
+              <a:rPr lang="en-GB" sz="1200" dirty="0" smtClean="0">
+                <a:solidFill>
+                  <a:schemeClr val="tx1">
+                    <a:lumMod val="50000"/>
+                    <a:lumOff val="50000"/>
+                  </a:schemeClr>
+                </a:solidFill>
+              </a:rPr>
+              <a:t>http://en.wikipedia.org/wiki/File:Astar_progress_animation.gif</a:t>
+            </a:r>
+            <a:endParaRPr lang="en-GB" sz="1200" dirty="0">
+              <a:solidFill>
+                <a:schemeClr val="tx1">
+                  <a:lumMod val="50000"/>
+                  <a:lumOff val="50000"/>
+                </a:schemeClr>
+              </a:solidFill>
+            </a:endParaRPr>
           </a:p>
         </p:txBody>
       </p:sp>
     </p:spTree>
     <p:extLst>
       <p:ext uri="{BB962C8B-B14F-4D97-AF65-F5344CB8AC3E}">
-        <p14:creationId xmlns:p14="http://schemas.microsoft.com/office/powerpoint/2010/main" val="4237043840"/>
+        <p14:creationId xmlns:p14="http://schemas.microsoft.com/office/powerpoint/2010/main" val="2851810272"/>
       </p:ext>
     </p:extLst>
   </p:cSld>
   <p:clrMapOvr>
     <a:masterClrMapping/>
   </p:clrMapOvr>
+  <p:timing>
+    <p:tnLst>
+      <p:par>
+        <p:cTn id="1" dur="indefinite" restart="never" nodeType="tmRoot"/>
+      </p:par>
+    </p:tnLst>
+  </p:timing>
 </p:sld>
 </file>
 
@@ -5716,78 +5839,6 @@
           <a:p>
             <a:r>
               <a:rPr lang="en-GB" dirty="0" smtClean="0"/>
-              <a:t>3D Point Cloud – Voxel Grid</a:t>
-            </a:r>
-            <a:endParaRPr lang="en-GB" dirty="0"/>
-          </a:p>
-        </p:txBody>
-      </p:sp>
-      <p:sp>
-        <p:nvSpPr>
-          <p:cNvPr id="3" name="Content Placeholder 2"/>
-          <p:cNvSpPr>
-            <a:spLocks noGrp="1"/>
-          </p:cNvSpPr>
-          <p:nvPr>
-            <p:ph idx="1"/>
-          </p:nvPr>
-        </p:nvSpPr>
-        <p:spPr/>
-        <p:txBody>
-          <a:bodyPr/>
-          <a:lstStyle/>
-          <a:p>
-            <a:endParaRPr lang="en-GB"/>
-          </a:p>
-        </p:txBody>
-      </p:sp>
-    </p:spTree>
-    <p:extLst>
-      <p:ext uri="{BB962C8B-B14F-4D97-AF65-F5344CB8AC3E}">
-        <p14:creationId xmlns:p14="http://schemas.microsoft.com/office/powerpoint/2010/main" val="4078062475"/>
-      </p:ext>
-    </p:extLst>
-  </p:cSld>
-  <p:clrMapOvr>
-    <a:masterClrMapping/>
-  </p:clrMapOvr>
-</p:sld>
-</file>
-
-<file path=ppt/slides/slide9.xml><?xml version="1.0" encoding="utf-8"?>
-<p:sld xmlns:a="http://schemas.openxmlformats.org/drawingml/2006/main" xmlns:r="http://schemas.openxmlformats.org/officeDocument/2006/relationships" xmlns:p="http://schemas.openxmlformats.org/presentationml/2006/main">
-  <p:cSld>
-    <p:spTree>
-      <p:nvGrpSpPr>
-        <p:cNvPr id="1" name=""/>
-        <p:cNvGrpSpPr/>
-        <p:nvPr/>
-      </p:nvGrpSpPr>
-      <p:grpSpPr>
-        <a:xfrm>
-          <a:off x="0" y="0"/>
-          <a:ext cx="0" cy="0"/>
-          <a:chOff x="0" y="0"/>
-          <a:chExt cx="0" cy="0"/>
-        </a:xfrm>
-      </p:grpSpPr>
-      <p:sp>
-        <p:nvSpPr>
-          <p:cNvPr id="2" name="Title 1"/>
-          <p:cNvSpPr>
-            <a:spLocks noGrp="1"/>
-          </p:cNvSpPr>
-          <p:nvPr>
-            <p:ph type="title"/>
-          </p:nvPr>
-        </p:nvSpPr>
-        <p:spPr/>
-        <p:txBody>
-          <a:bodyPr/>
-          <a:lstStyle/>
-          <a:p>
-            <a:r>
-              <a:rPr lang="en-GB" dirty="0" smtClean="0"/>
               <a:t>3D Point Cloud – Floor Detection</a:t>
             </a:r>
             <a:endParaRPr lang="en-GB" dirty="0"/>
@@ -5908,6 +5959,305 @@
   <p:clrMapOvr>
     <a:masterClrMapping/>
   </p:clrMapOvr>
+</p:sld>
+</file>
+
+<file path=ppt/slides/slide9.xml><?xml version="1.0" encoding="utf-8"?>
+<p:sld xmlns:a="http://schemas.openxmlformats.org/drawingml/2006/main" xmlns:r="http://schemas.openxmlformats.org/officeDocument/2006/relationships" xmlns:p="http://schemas.openxmlformats.org/presentationml/2006/main">
+  <p:cSld>
+    <p:spTree>
+      <p:nvGrpSpPr>
+        <p:cNvPr id="1" name=""/>
+        <p:cNvGrpSpPr/>
+        <p:nvPr/>
+      </p:nvGrpSpPr>
+      <p:grpSpPr>
+        <a:xfrm>
+          <a:off x="0" y="0"/>
+          <a:ext cx="0" cy="0"/>
+          <a:chOff x="0" y="0"/>
+          <a:chExt cx="0" cy="0"/>
+        </a:xfrm>
+      </p:grpSpPr>
+      <p:sp>
+        <p:nvSpPr>
+          <p:cNvPr id="2" name="Title 1"/>
+          <p:cNvSpPr>
+            <a:spLocks noGrp="1"/>
+          </p:cNvSpPr>
+          <p:nvPr>
+            <p:ph type="title"/>
+          </p:nvPr>
+        </p:nvSpPr>
+        <p:spPr/>
+        <p:txBody>
+          <a:bodyPr>
+            <a:normAutofit fontScale="90000"/>
+          </a:bodyPr>
+          <a:lstStyle/>
+          <a:p>
+            <a:r>
+              <a:rPr lang="en-GB" dirty="0" smtClean="0"/>
+              <a:t>3D Point Cloud - Voxel Grid </a:t>
+            </a:r>
+            <a:r>
+              <a:rPr lang="en-GB" dirty="0" err="1" smtClean="0"/>
+              <a:t>Downsampling</a:t>
+            </a:r>
+            <a:r>
+              <a:rPr lang="en-GB" dirty="0" smtClean="0"/>
+              <a:t> </a:t>
+            </a:r>
+            <a:endParaRPr lang="en-GB" dirty="0"/>
+          </a:p>
+        </p:txBody>
+      </p:sp>
+      <p:sp>
+        <p:nvSpPr>
+          <p:cNvPr id="3" name="Content Placeholder 2"/>
+          <p:cNvSpPr>
+            <a:spLocks noGrp="1"/>
+          </p:cNvSpPr>
+          <p:nvPr>
+            <p:ph sz="half" idx="1"/>
+          </p:nvPr>
+        </p:nvSpPr>
+        <p:spPr/>
+        <p:txBody>
+          <a:bodyPr>
+            <a:normAutofit fontScale="92500" lnSpcReduction="10000"/>
+          </a:bodyPr>
+          <a:lstStyle/>
+          <a:p>
+            <a:r>
+              <a:rPr lang="en-GB" dirty="0" smtClean="0"/>
+              <a:t>Reasons we </a:t>
+            </a:r>
+            <a:r>
+              <a:rPr lang="en-GB" dirty="0" err="1" smtClean="0"/>
+              <a:t>downsampled</a:t>
+            </a:r>
+            <a:r>
+              <a:rPr lang="en-GB" dirty="0" smtClean="0"/>
+              <a:t> in a uniform grid:</a:t>
+            </a:r>
+          </a:p>
+          <a:p>
+            <a:pPr lvl="1"/>
+            <a:r>
+              <a:rPr lang="en-GB" dirty="0" smtClean="0"/>
+              <a:t>Speed (too many points)</a:t>
+            </a:r>
+          </a:p>
+          <a:p>
+            <a:pPr lvl="1"/>
+            <a:r>
+              <a:rPr lang="en-GB" dirty="0" smtClean="0"/>
+              <a:t>Larger point density close to Kinect</a:t>
+            </a:r>
+          </a:p>
+          <a:p>
+            <a:r>
+              <a:rPr lang="en-GB" dirty="0" smtClean="0"/>
+              <a:t>PCL’s built in filter creates a 3D voxel grid over the point cloud data</a:t>
+            </a:r>
+          </a:p>
+          <a:p>
+            <a:pPr lvl="1"/>
+            <a:r>
+              <a:rPr lang="en-GB" dirty="0" err="1" smtClean="0"/>
+              <a:t>Downsamples</a:t>
+            </a:r>
+            <a:r>
+              <a:rPr lang="en-GB" dirty="0" smtClean="0"/>
+              <a:t> using centroids of all points in voxel</a:t>
+            </a:r>
+            <a:r>
+              <a:rPr lang="en-GB" baseline="30000" dirty="0" smtClean="0"/>
+              <a:t>[1]</a:t>
+            </a:r>
+          </a:p>
+          <a:p>
+            <a:pPr lvl="1"/>
+            <a:endParaRPr lang="en-GB" dirty="0" smtClean="0"/>
+          </a:p>
+        </p:txBody>
+      </p:sp>
+      <p:pic>
+        <p:nvPicPr>
+          <p:cNvPr id="2050" name="Picture 2" descr="H:\kinect-wheelchair\figures\003-RANSAC-ground-plane-detection.png"/>
+          <p:cNvPicPr>
+            <a:picLocks noChangeAspect="1" noChangeArrowheads="1"/>
+          </p:cNvPicPr>
+          <p:nvPr/>
+        </p:nvPicPr>
+        <p:blipFill>
+          <a:blip r:embed="rId2" cstate="print">
+            <a:extLst>
+              <a:ext uri="{28A0092B-C50C-407E-A947-70E740481C1C}">
+                <a14:useLocalDpi xmlns:a14="http://schemas.microsoft.com/office/drawing/2010/main" val="0"/>
+              </a:ext>
+            </a:extLst>
+          </a:blip>
+          <a:srcRect/>
+          <a:stretch>
+            <a:fillRect/>
+          </a:stretch>
+        </p:blipFill>
+        <p:spPr bwMode="auto">
+          <a:xfrm>
+            <a:off x="5220071" y="1484784"/>
+            <a:ext cx="3600401" cy="2167716"/>
+          </a:xfrm>
+          <a:prstGeom prst="rect">
+            <a:avLst/>
+          </a:prstGeom>
+          <a:noFill/>
+          <a:extLst>
+            <a:ext uri="{909E8E84-426E-40DD-AFC4-6F175D3DCCD1}">
+              <a14:hiddenFill xmlns:a14="http://schemas.microsoft.com/office/drawing/2010/main">
+                <a:solidFill>
+                  <a:srgbClr val="FFFFFF"/>
+                </a:solidFill>
+              </a14:hiddenFill>
+            </a:ext>
+          </a:extLst>
+        </p:spPr>
+      </p:pic>
+      <p:pic>
+        <p:nvPicPr>
+          <p:cNvPr id="2051" name="Picture 3" descr="H:\kinect-wheelchair\figures\004-voxel-downsampling.png"/>
+          <p:cNvPicPr>
+            <a:picLocks noChangeAspect="1" noChangeArrowheads="1"/>
+          </p:cNvPicPr>
+          <p:nvPr/>
+        </p:nvPicPr>
+        <p:blipFill>
+          <a:blip r:embed="rId3">
+            <a:extLst>
+              <a:ext uri="{BEBA8EAE-BF5A-486C-A8C5-ECC9F3942E4B}">
+                <a14:imgProps xmlns:a14="http://schemas.microsoft.com/office/drawing/2010/main">
+                  <a14:imgLayer r:embed="rId4">
+                    <a14:imgEffect>
+                      <a14:brightnessContrast bright="91000" contrast="100000"/>
+                    </a14:imgEffect>
+                  </a14:imgLayer>
+                </a14:imgProps>
+              </a:ext>
+              <a:ext uri="{28A0092B-C50C-407E-A947-70E740481C1C}">
+                <a14:useLocalDpi xmlns:a14="http://schemas.microsoft.com/office/drawing/2010/main" val="0"/>
+              </a:ext>
+            </a:extLst>
+          </a:blip>
+          <a:srcRect/>
+          <a:stretch>
+            <a:fillRect/>
+          </a:stretch>
+        </p:blipFill>
+        <p:spPr bwMode="auto">
+          <a:xfrm>
+            <a:off x="5220072" y="4092622"/>
+            <a:ext cx="3600400" cy="2288706"/>
+          </a:xfrm>
+          <a:prstGeom prst="rect">
+            <a:avLst/>
+          </a:prstGeom>
+          <a:noFill/>
+          <a:extLst>
+            <a:ext uri="{909E8E84-426E-40DD-AFC4-6F175D3DCCD1}">
+              <a14:hiddenFill xmlns:a14="http://schemas.microsoft.com/office/drawing/2010/main">
+                <a:solidFill>
+                  <a:srgbClr val="FFFFFF"/>
+                </a:solidFill>
+              </a14:hiddenFill>
+            </a:ext>
+          </a:extLst>
+        </p:spPr>
+      </p:pic>
+      <p:sp>
+        <p:nvSpPr>
+          <p:cNvPr id="5" name="Down Arrow 4"/>
+          <p:cNvSpPr/>
+          <p:nvPr/>
+        </p:nvSpPr>
+        <p:spPr>
+          <a:xfrm>
+            <a:off x="6660232" y="3429000"/>
+            <a:ext cx="576064" cy="864096"/>
+          </a:xfrm>
+          <a:prstGeom prst="downArrow">
+            <a:avLst/>
+          </a:prstGeom>
+        </p:spPr>
+        <p:style>
+          <a:lnRef idx="2">
+            <a:schemeClr val="dk1"/>
+          </a:lnRef>
+          <a:fillRef idx="1">
+            <a:schemeClr val="lt1"/>
+          </a:fillRef>
+          <a:effectRef idx="0">
+            <a:schemeClr val="dk1"/>
+          </a:effectRef>
+          <a:fontRef idx="minor">
+            <a:schemeClr val="dk1"/>
+          </a:fontRef>
+        </p:style>
+        <p:txBody>
+          <a:bodyPr rtlCol="0" anchor="ctr"/>
+          <a:lstStyle/>
+          <a:p>
+            <a:pPr algn="ctr"/>
+            <a:endParaRPr lang="en-GB"/>
+          </a:p>
+        </p:txBody>
+      </p:sp>
+      <p:sp>
+        <p:nvSpPr>
+          <p:cNvPr id="6" name="Rectangle 5"/>
+          <p:cNvSpPr/>
+          <p:nvPr/>
+        </p:nvSpPr>
+        <p:spPr>
+          <a:xfrm>
+            <a:off x="107504" y="6525344"/>
+            <a:ext cx="5004048" cy="276999"/>
+          </a:xfrm>
+          <a:prstGeom prst="rect">
+            <a:avLst/>
+          </a:prstGeom>
+        </p:spPr>
+        <p:txBody>
+          <a:bodyPr wrap="square">
+            <a:spAutoFit/>
+          </a:bodyPr>
+          <a:lstStyle/>
+          <a:p>
+            <a:r>
+              <a:rPr lang="en-GB" sz="1200" dirty="0" smtClean="0"/>
+              <a:t>[1] http://docs.pointclouds.org/trunk/classpcl_1_1_voxel_grid.html#_details</a:t>
+            </a:r>
+            <a:endParaRPr lang="en-GB" sz="1200" dirty="0"/>
+          </a:p>
+        </p:txBody>
+      </p:sp>
+    </p:spTree>
+    <p:extLst>
+      <p:ext uri="{BB962C8B-B14F-4D97-AF65-F5344CB8AC3E}">
+        <p14:creationId xmlns:p14="http://schemas.microsoft.com/office/powerpoint/2010/main" val="3142039948"/>
+      </p:ext>
+    </p:extLst>
+  </p:cSld>
+  <p:clrMapOvr>
+    <a:masterClrMapping/>
+  </p:clrMapOvr>
+  <p:timing>
+    <p:tnLst>
+      <p:par>
+        <p:cTn id="1" dur="indefinite" restart="never" nodeType="tmRoot"/>
+      </p:par>
+    </p:tnLst>
+  </p:timing>
 </p:sld>
 </file>
 

</xml_diff>

<commit_message>
figure added to point cloud slide
</commit_message>
<xml_diff>
--- a/Autonomous Wheelchair using Structured Light.pptx
+++ b/Autonomous Wheelchair using Structured Light.pptx
@@ -5573,6 +5573,36 @@
           </a:p>
         </p:txBody>
       </p:sp>
+      <p:pic>
+        <p:nvPicPr>
+          <p:cNvPr id="4" name="Picture 3"/>
+          <p:cNvPicPr>
+            <a:picLocks noChangeAspect="1"/>
+          </p:cNvPicPr>
+          <p:nvPr/>
+        </p:nvPicPr>
+        <p:blipFill>
+          <a:blip r:embed="rId2">
+            <a:extLst>
+              <a:ext uri="{28A0092B-C50C-407E-A947-70E740481C1C}">
+                <a14:useLocalDpi xmlns:a14="http://schemas.microsoft.com/office/drawing/2010/main" val="0"/>
+              </a:ext>
+            </a:extLst>
+          </a:blip>
+          <a:stretch>
+            <a:fillRect/>
+          </a:stretch>
+        </p:blipFill>
+        <p:spPr>
+          <a:xfrm>
+            <a:off x="1763688" y="2708920"/>
+            <a:ext cx="5487259" cy="3622448"/>
+          </a:xfrm>
+          <a:prstGeom prst="rect">
+            <a:avLst/>
+          </a:prstGeom>
+        </p:spPr>
+      </p:pic>
     </p:spTree>
     <p:extLst>
       <p:ext uri="{BB962C8B-B14F-4D97-AF65-F5344CB8AC3E}">

</xml_diff>